<commit_message>
Semi-final version of 2nd presentation
</commit_message>
<xml_diff>
--- a/presentations/pdis2.pptx
+++ b/presentations/pdis2.pptx
@@ -5,7 +5,7 @@
     <p:sldMasterId id="2147483648" r:id="rId1"/>
   </p:sldMasterIdLst>
   <p:notesMasterIdLst>
-    <p:notesMasterId r:id="rId15"/>
+    <p:notesMasterId r:id="rId14"/>
   </p:notesMasterIdLst>
   <p:sldIdLst>
     <p:sldId id="256" r:id="rId2"/>
@@ -18,9 +18,8 @@
     <p:sldId id="262" r:id="rId9"/>
     <p:sldId id="271" r:id="rId10"/>
     <p:sldId id="263" r:id="rId11"/>
-    <p:sldId id="264" r:id="rId12"/>
-    <p:sldId id="270" r:id="rId13"/>
-    <p:sldId id="265" r:id="rId14"/>
+    <p:sldId id="270" r:id="rId12"/>
+    <p:sldId id="265" r:id="rId13"/>
   </p:sldIdLst>
   <p:sldSz cx="9144000" cy="6858000" type="screen4x3"/>
   <p:notesSz cx="6858000" cy="9144000"/>
@@ -4155,32 +4154,55 @@
         <p:spPr/>
         <p:txBody>
           <a:bodyPr>
-            <a:normAutofit/>
+            <a:normAutofit fontScale="92500" lnSpcReduction="10000"/>
           </a:bodyPr>
           <a:lstStyle/>
           <a:p>
+            <a:pPr>
+              <a:lnSpc>
+                <a:spcPct val="150000"/>
+              </a:lnSpc>
+            </a:pPr>
             <a:r>
               <a:rPr lang="pt-PT" dirty="0" smtClean="0"/>
               <a:t>How to give better tools to teachers?</a:t>
             </a:r>
           </a:p>
           <a:p>
-            <a:pPr lvl="1"/>
+            <a:pPr lvl="1">
+              <a:lnSpc>
+                <a:spcPct val="150000"/>
+              </a:lnSpc>
+            </a:pPr>
             <a:r>
               <a:rPr lang="pt-PT" dirty="0" smtClean="0"/>
               <a:t>Let them build the tools they need!</a:t>
             </a:r>
           </a:p>
           <a:p>
+            <a:pPr>
+              <a:lnSpc>
+                <a:spcPct val="150000"/>
+              </a:lnSpc>
+            </a:pPr>
             <a:r>
               <a:rPr lang="pt-PT" dirty="0" smtClean="0"/>
               <a:t>A specific architecture is required to allow end-users to model their own systems</a:t>
             </a:r>
           </a:p>
           <a:p>
+            <a:pPr>
+              <a:lnSpc>
+                <a:spcPct val="150000"/>
+              </a:lnSpc>
+            </a:pPr>
             <a:r>
               <a:rPr lang="pt-PT" dirty="0" smtClean="0"/>
-              <a:t>AOM and Oghma provide this missing functionality</a:t>
+              <a:t>AOMs </a:t>
+            </a:r>
+            <a:r>
+              <a:rPr lang="pt-PT" dirty="0" smtClean="0"/>
+              <a:t>and Oghma provide this missing functionality</a:t>
             </a:r>
             <a:endParaRPr lang="en-US" dirty="0"/>
           </a:p>
@@ -4259,68 +4281,7 @@
           <a:p>
             <a:r>
               <a:rPr lang="pt-PT" dirty="0" smtClean="0"/>
-              <a:t>Past Work</a:t>
-            </a:r>
-            <a:endParaRPr lang="en-US" dirty="0"/>
-          </a:p>
-        </p:txBody>
-      </p:sp>
-      <p:sp>
-        <p:nvSpPr>
-          <p:cNvPr id="3" name="Content Placeholder 2"/>
-          <p:cNvSpPr>
-            <a:spLocks noGrp="1"/>
-          </p:cNvSpPr>
-          <p:nvPr>
-            <p:ph idx="1"/>
-          </p:nvPr>
-        </p:nvSpPr>
-        <p:spPr/>
-        <p:txBody>
-          <a:bodyPr/>
-          <a:lstStyle/>
-          <a:p>
-            <a:pPr>
-              <a:lnSpc>
-                <a:spcPct val="150000"/>
-              </a:lnSpc>
-            </a:pPr>
-            <a:r>
-              <a:rPr lang="pt-PT" dirty="0" smtClean="0"/>
-              <a:t>State of the art report</a:t>
-            </a:r>
-          </a:p>
-          <a:p>
-            <a:pPr>
-              <a:lnSpc>
-                <a:spcPct val="150000"/>
-              </a:lnSpc>
-            </a:pPr>
-            <a:r>
-              <a:rPr lang="pt-PT" dirty="0" smtClean="0"/>
-              <a:t>AOM study</a:t>
-            </a:r>
-          </a:p>
-          <a:p>
-            <a:pPr lvl="1">
-              <a:lnSpc>
-                <a:spcPct val="150000"/>
-              </a:lnSpc>
-            </a:pPr>
-            <a:r>
-              <a:rPr lang="pt-PT" dirty="0" smtClean="0"/>
-              <a:t>AOM architecture and inherent design patterns</a:t>
-            </a:r>
-          </a:p>
-          <a:p>
-            <a:pPr>
-              <a:lnSpc>
-                <a:spcPct val="150000"/>
-              </a:lnSpc>
-            </a:pPr>
-            <a:r>
-              <a:rPr lang="pt-PT" dirty="0" smtClean="0"/>
-              <a:t>Oghma framework study</a:t>
+              <a:t>Thesis Work Plan</a:t>
             </a:r>
             <a:endParaRPr lang="en-US" dirty="0"/>
           </a:p>
@@ -4345,85 +4306,6 @@
               <a:rPr lang="en-US" smtClean="0"/>
               <a:pPr/>
               <a:t>11</a:t>
-            </a:fld>
-            <a:endParaRPr lang="en-US"/>
-          </a:p>
-        </p:txBody>
-      </p:sp>
-    </p:spTree>
-  </p:cSld>
-  <p:clrMapOvr>
-    <a:masterClrMapping/>
-  </p:clrMapOvr>
-  <p:timing>
-    <p:tnLst>
-      <p:par>
-        <p:cTn id="1" dur="indefinite" restart="never" nodeType="tmRoot"/>
-      </p:par>
-    </p:tnLst>
-  </p:timing>
-</p:sld>
-</file>
-
-<file path=ppt/slides/slide12.xml><?xml version="1.0" encoding="utf-8"?>
-<p:sld xmlns:a="http://schemas.openxmlformats.org/drawingml/2006/main" xmlns:r="http://schemas.openxmlformats.org/officeDocument/2006/relationships" xmlns:p="http://schemas.openxmlformats.org/presentationml/2006/main">
-  <p:cSld>
-    <p:spTree>
-      <p:nvGrpSpPr>
-        <p:cNvPr id="1" name=""/>
-        <p:cNvGrpSpPr/>
-        <p:nvPr/>
-      </p:nvGrpSpPr>
-      <p:grpSpPr>
-        <a:xfrm>
-          <a:off x="0" y="0"/>
-          <a:ext cx="0" cy="0"/>
-          <a:chOff x="0" y="0"/>
-          <a:chExt cx="0" cy="0"/>
-        </a:xfrm>
-      </p:grpSpPr>
-      <p:sp>
-        <p:nvSpPr>
-          <p:cNvPr id="2" name="Title 1"/>
-          <p:cNvSpPr>
-            <a:spLocks noGrp="1"/>
-          </p:cNvSpPr>
-          <p:nvPr>
-            <p:ph type="title"/>
-          </p:nvPr>
-        </p:nvSpPr>
-        <p:spPr/>
-        <p:txBody>
-          <a:bodyPr/>
-          <a:lstStyle/>
-          <a:p>
-            <a:r>
-              <a:rPr lang="pt-PT" dirty="0" smtClean="0"/>
-              <a:t>Thesis Work Plan</a:t>
-            </a:r>
-            <a:endParaRPr lang="en-US" dirty="0"/>
-          </a:p>
-        </p:txBody>
-      </p:sp>
-      <p:sp>
-        <p:nvSpPr>
-          <p:cNvPr id="4" name="Slide Number Placeholder 3"/>
-          <p:cNvSpPr>
-            <a:spLocks noGrp="1"/>
-          </p:cNvSpPr>
-          <p:nvPr>
-            <p:ph type="sldNum" sz="quarter" idx="12"/>
-          </p:nvPr>
-        </p:nvSpPr>
-        <p:spPr/>
-        <p:txBody>
-          <a:bodyPr/>
-          <a:lstStyle/>
-          <a:p>
-            <a:fld id="{B6F15528-21DE-4FAA-801E-634DDDAF4B2B}" type="slidenum">
-              <a:rPr lang="en-US" smtClean="0"/>
-              <a:pPr/>
-              <a:t>12</a:t>
             </a:fld>
             <a:endParaRPr lang="en-US"/>
           </a:p>
@@ -11994,7 +11876,7 @@
 </p:sld>
 </file>
 
-<file path=ppt/slides/slide13.xml><?xml version="1.0" encoding="utf-8"?>
+<file path=ppt/slides/slide12.xml><?xml version="1.0" encoding="utf-8"?>
 <p:sld xmlns:a="http://schemas.openxmlformats.org/drawingml/2006/main" xmlns:r="http://schemas.openxmlformats.org/officeDocument/2006/relationships" xmlns:p="http://schemas.openxmlformats.org/presentationml/2006/main">
   <p:cSld>
     <p:bg>
@@ -12094,7 +11976,7 @@
             <a:fld id="{B6F15528-21DE-4FAA-801E-634DDDAF4B2B}" type="slidenum">
               <a:rPr lang="en-US" smtClean="0"/>
               <a:pPr/>
-              <a:t>13</a:t>
+              <a:t>12</a:t>
             </a:fld>
             <a:endParaRPr lang="en-US"/>
           </a:p>
@@ -12310,7 +12192,6 @@
               <a:rPr lang="pt-PT" dirty="0" smtClean="0"/>
               <a:t>Allow the end-users to tailor the system to their own needs</a:t>
             </a:r>
-            <a:endParaRPr lang="pt-PT" dirty="0" smtClean="0"/>
           </a:p>
           <a:p>
             <a:pPr>
@@ -12322,7 +12203,6 @@
               <a:rPr lang="pt-PT" dirty="0" smtClean="0"/>
               <a:t>Accelerate development of highly customizable systems</a:t>
             </a:r>
-            <a:endParaRPr lang="pt-PT" dirty="0" smtClean="0"/>
           </a:p>
         </p:txBody>
       </p:sp>
@@ -12401,7 +12281,15 @@
           <a:p>
             <a:r>
               <a:rPr lang="pt-PT" dirty="0" smtClean="0"/>
-              <a:t>State of the Art – Adaptive System</a:t>
+              <a:t>State of the Art – Adaptive </a:t>
+            </a:r>
+            <a:r>
+              <a:rPr lang="pt-PT" dirty="0" smtClean="0"/>
+              <a:t>Systems</a:t>
+            </a:r>
+            <a:r>
+              <a:rPr lang="pt-PT" dirty="0" smtClean="0"/>
+              <a:t/>
             </a:r>
             <a:br>
               <a:rPr lang="pt-PT" dirty="0" smtClean="0"/>
@@ -12755,7 +12643,15 @@
             </a:pPr>
             <a:r>
               <a:rPr lang="pt-PT" dirty="0" smtClean="0"/>
-              <a:t>A system can be configured by a domain expert using a DSL</a:t>
+              <a:t>A system can be </a:t>
+            </a:r>
+            <a:r>
+              <a:rPr lang="pt-PT" dirty="0" smtClean="0"/>
+              <a:t>bootstraped </a:t>
+            </a:r>
+            <a:r>
+              <a:rPr lang="pt-PT" dirty="0" smtClean="0"/>
+              <a:t>by a domain expert using a DSL</a:t>
             </a:r>
           </a:p>
           <a:p>
@@ -12766,8 +12662,13 @@
             </a:pPr>
             <a:r>
               <a:rPr lang="pt-PT" dirty="0" smtClean="0"/>
-              <a:t>Allows for changes to a system’s architecture in runtime</a:t>
+              <a:t>Allows for changes to a system’s architecture in </a:t>
             </a:r>
+            <a:r>
+              <a:rPr lang="pt-PT" dirty="0" smtClean="0"/>
+              <a:t>runtime by the end-users</a:t>
+            </a:r>
+            <a:endParaRPr lang="pt-PT" dirty="0" smtClean="0"/>
           </a:p>
         </p:txBody>
       </p:sp>
@@ -13365,15 +13266,7 @@
             </a:pPr>
             <a:r>
               <a:rPr lang="pt-PT" dirty="0" smtClean="0"/>
-              <a:t>Allows for the easy creation of highly-customizable, </a:t>
-            </a:r>
-            <a:r>
-              <a:rPr lang="pt-PT" dirty="0" smtClean="0"/>
-              <a:t>dynamic information </a:t>
-            </a:r>
-            <a:r>
-              <a:rPr lang="pt-PT" dirty="0" smtClean="0"/>
-              <a:t>systems</a:t>
+              <a:t>Allows for the easy creation of highly-customizable, dynamic information systems</a:t>
             </a:r>
           </a:p>
           <a:p>

</xml_diff>

<commit_message>
Updated presentation and work plan
</commit_message>
<xml_diff>
--- a/presentations/pdis2.pptx
+++ b/presentations/pdis2.pptx
@@ -15,8 +15,8 @@
     <p:sldId id="269" r:id="rId6"/>
     <p:sldId id="261" r:id="rId7"/>
     <p:sldId id="268" r:id="rId8"/>
-    <p:sldId id="262" r:id="rId9"/>
-    <p:sldId id="271" r:id="rId10"/>
+    <p:sldId id="271" r:id="rId9"/>
+    <p:sldId id="273" r:id="rId10"/>
     <p:sldId id="263" r:id="rId11"/>
     <p:sldId id="270" r:id="rId12"/>
     <p:sldId id="265" r:id="rId13"/>
@@ -204,7 +204,7 @@
             <a:fld id="{CFCF6AD8-7A09-4100-B9D8-1AE70CE17931}" type="datetimeFigureOut">
               <a:rPr lang="en-US" smtClean="0"/>
               <a:pPr/>
-              <a:t>7/13/2010</a:t>
+              <a:t>7/14/2010</a:t>
             </a:fld>
             <a:endParaRPr lang="en-US"/>
           </a:p>
@@ -835,6 +835,105 @@
             <a:fld id="{FFF7D76E-A8BA-4CEC-B928-C6E76C14B19A}" type="slidenum">
               <a:rPr lang="en-US" smtClean="0"/>
               <a:pPr/>
+              <a:t>8</a:t>
+            </a:fld>
+            <a:endParaRPr lang="en-US"/>
+          </a:p>
+        </p:txBody>
+      </p:sp>
+    </p:spTree>
+  </p:cSld>
+  <p:clrMapOvr>
+    <a:masterClrMapping/>
+  </p:clrMapOvr>
+</p:notes>
+</file>
+
+<file path=ppt/notesSlides/notesSlide5.xml><?xml version="1.0" encoding="utf-8"?>
+<p:notes xmlns:a="http://schemas.openxmlformats.org/drawingml/2006/main" xmlns:r="http://schemas.openxmlformats.org/officeDocument/2006/relationships" xmlns:p="http://schemas.openxmlformats.org/presentationml/2006/main">
+  <p:cSld>
+    <p:spTree>
+      <p:nvGrpSpPr>
+        <p:cNvPr id="1" name=""/>
+        <p:cNvGrpSpPr/>
+        <p:nvPr/>
+      </p:nvGrpSpPr>
+      <p:grpSpPr>
+        <a:xfrm>
+          <a:off x="0" y="0"/>
+          <a:ext cx="0" cy="0"/>
+          <a:chOff x="0" y="0"/>
+          <a:chExt cx="0" cy="0"/>
+        </a:xfrm>
+      </p:grpSpPr>
+      <p:sp>
+        <p:nvSpPr>
+          <p:cNvPr id="2" name="Slide Image Placeholder 1"/>
+          <p:cNvSpPr>
+            <a:spLocks noGrp="1" noRot="1" noChangeAspect="1"/>
+          </p:cNvSpPr>
+          <p:nvPr>
+            <p:ph type="sldImg"/>
+          </p:nvPr>
+        </p:nvSpPr>
+        <p:spPr/>
+      </p:sp>
+      <p:sp>
+        <p:nvSpPr>
+          <p:cNvPr id="3" name="Notes Placeholder 2"/>
+          <p:cNvSpPr>
+            <a:spLocks noGrp="1"/>
+          </p:cNvSpPr>
+          <p:nvPr>
+            <p:ph type="body" idx="1"/>
+          </p:nvPr>
+        </p:nvSpPr>
+        <p:spPr/>
+        <p:txBody>
+          <a:bodyPr>
+            <a:normAutofit/>
+          </a:bodyPr>
+          <a:lstStyle/>
+          <a:p>
+            <a:r>
+              <a:rPr lang="pt-PT" dirty="0" smtClean="0"/>
+              <a:t>Lesser</a:t>
+            </a:r>
+            <a:r>
+              <a:rPr lang="pt-PT" baseline="0" dirty="0" smtClean="0"/>
+              <a:t> objectives</a:t>
+            </a:r>
+          </a:p>
+          <a:p>
+            <a:endParaRPr lang="pt-PT" baseline="0" dirty="0" smtClean="0"/>
+          </a:p>
+          <a:p>
+            <a:r>
+              <a:rPr lang="pt-PT" baseline="0" dirty="0" smtClean="0"/>
+              <a:t>Study AOM architectures and inherent patterns</a:t>
+            </a:r>
+            <a:endParaRPr lang="en-US" dirty="0"/>
+          </a:p>
+        </p:txBody>
+      </p:sp>
+      <p:sp>
+        <p:nvSpPr>
+          <p:cNvPr id="4" name="Slide Number Placeholder 3"/>
+          <p:cNvSpPr>
+            <a:spLocks noGrp="1"/>
+          </p:cNvSpPr>
+          <p:nvPr>
+            <p:ph type="sldNum" sz="quarter" idx="10"/>
+          </p:nvPr>
+        </p:nvSpPr>
+        <p:spPr/>
+        <p:txBody>
+          <a:bodyPr/>
+          <a:lstStyle/>
+          <a:p>
+            <a:fld id="{FFF7D76E-A8BA-4CEC-B928-C6E76C14B19A}" type="slidenum">
+              <a:rPr lang="en-US" smtClean="0"/>
+              <a:pPr/>
               <a:t>9</a:t>
             </a:fld>
             <a:endParaRPr lang="en-US"/>
@@ -1031,7 +1130,7 @@
             <a:fld id="{D152DF54-25FE-4726-A2C4-A49E5133F562}" type="datetime1">
               <a:rPr lang="en-US" smtClean="0"/>
               <a:pPr/>
-              <a:t>7/13/2010</a:t>
+              <a:t>7/14/2010</a:t>
             </a:fld>
             <a:endParaRPr lang="en-US"/>
           </a:p>
@@ -1198,7 +1297,7 @@
             <a:fld id="{FBC3CF1C-1A02-4F3A-B54C-A99E00D892E7}" type="datetime1">
               <a:rPr lang="en-US" smtClean="0"/>
               <a:pPr/>
-              <a:t>7/13/2010</a:t>
+              <a:t>7/14/2010</a:t>
             </a:fld>
             <a:endParaRPr lang="en-US"/>
           </a:p>
@@ -1375,7 +1474,7 @@
             <a:fld id="{E6DC7923-D324-4BC8-9BF7-BAFC14B0206A}" type="datetime1">
               <a:rPr lang="en-US" smtClean="0"/>
               <a:pPr/>
-              <a:t>7/13/2010</a:t>
+              <a:t>7/14/2010</a:t>
             </a:fld>
             <a:endParaRPr lang="en-US"/>
           </a:p>
@@ -1583,7 +1682,7 @@
             <a:fld id="{44A65452-C42D-4071-9AFC-FE25FA090C9C}" type="datetime1">
               <a:rPr lang="en-US" smtClean="0"/>
               <a:pPr/>
-              <a:t>7/13/2010</a:t>
+              <a:t>7/14/2010</a:t>
             </a:fld>
             <a:endParaRPr lang="en-US"/>
           </a:p>
@@ -1836,7 +1935,7 @@
             <a:fld id="{0F743A9E-C184-481E-87BD-0F0D56047404}" type="datetime1">
               <a:rPr lang="en-US" smtClean="0"/>
               <a:pPr/>
-              <a:t>7/13/2010</a:t>
+              <a:t>7/14/2010</a:t>
             </a:fld>
             <a:endParaRPr lang="en-US"/>
           </a:p>
@@ -2121,7 +2220,7 @@
             <a:fld id="{974A8010-2A62-4C06-9569-C5481F98A9B8}" type="datetime1">
               <a:rPr lang="en-US" smtClean="0"/>
               <a:pPr/>
-              <a:t>7/13/2010</a:t>
+              <a:t>7/14/2010</a:t>
             </a:fld>
             <a:endParaRPr lang="en-US"/>
           </a:p>
@@ -2540,7 +2639,7 @@
             <a:fld id="{6382FBE8-0209-4CDC-8BB9-0E743243CA23}" type="datetime1">
               <a:rPr lang="en-US" smtClean="0"/>
               <a:pPr/>
-              <a:t>7/13/2010</a:t>
+              <a:t>7/14/2010</a:t>
             </a:fld>
             <a:endParaRPr lang="en-US"/>
           </a:p>
@@ -2655,7 +2754,7 @@
             <a:fld id="{979EA3E0-2703-4015-99E8-D9C11011A436}" type="datetime1">
               <a:rPr lang="en-US" smtClean="0"/>
               <a:pPr/>
-              <a:t>7/13/2010</a:t>
+              <a:t>7/14/2010</a:t>
             </a:fld>
             <a:endParaRPr lang="en-US"/>
           </a:p>
@@ -2747,7 +2846,7 @@
             <a:fld id="{BDEAB48B-CDE6-44A6-8EE4-B51DA18DCC06}" type="datetime1">
               <a:rPr lang="en-US" smtClean="0"/>
               <a:pPr/>
-              <a:t>7/13/2010</a:t>
+              <a:t>7/14/2010</a:t>
             </a:fld>
             <a:endParaRPr lang="en-US"/>
           </a:p>
@@ -3021,7 +3120,7 @@
             <a:fld id="{A05EB600-233D-4993-9A0C-A734F7C6002E}" type="datetime1">
               <a:rPr lang="en-US" smtClean="0"/>
               <a:pPr/>
-              <a:t>7/13/2010</a:t>
+              <a:t>7/14/2010</a:t>
             </a:fld>
             <a:endParaRPr lang="en-US"/>
           </a:p>
@@ -3271,7 +3370,7 @@
             <a:fld id="{C5A2777C-3BAD-4973-8F82-C580DE89C960}" type="datetime1">
               <a:rPr lang="en-US" smtClean="0"/>
               <a:pPr/>
-              <a:t>7/13/2010</a:t>
+              <a:t>7/14/2010</a:t>
             </a:fld>
             <a:endParaRPr lang="en-US"/>
           </a:p>
@@ -3481,7 +3580,7 @@
             <a:fld id="{F818FC3B-9732-4FFA-B46E-00DD30FA6554}" type="datetime1">
               <a:rPr lang="en-US" smtClean="0"/>
               <a:pPr/>
-              <a:t>7/13/2010</a:t>
+              <a:t>7/14/2010</a:t>
             </a:fld>
             <a:endParaRPr lang="en-US"/>
           </a:p>
@@ -9950,14 +10049,20 @@
                     <a:p>
                       <a:pPr algn="r" fontAlgn="b"/>
                       <a:r>
-                        <a:rPr lang="en-US" sz="1200" b="0" i="0" u="none" strike="noStrike">
-                          <a:solidFill>
-                            <a:srgbClr val="000000"/>
-                          </a:solidFill>
-                          <a:latin typeface="Calibri"/>
-                        </a:rPr>
-                        <a:t>Tests</a:t>
-                      </a:r>
+                        <a:rPr lang="en-US" sz="1200" b="0" i="0" u="none" strike="noStrike" dirty="0" smtClean="0">
+                          <a:solidFill>
+                            <a:srgbClr val="000000"/>
+                          </a:solidFill>
+                          <a:latin typeface="Calibri"/>
+                        </a:rPr>
+                        <a:t>Tests &amp; Validation</a:t>
+                      </a:r>
+                      <a:endParaRPr lang="en-US" sz="1200" b="0" i="0" u="none" strike="noStrike" dirty="0">
+                        <a:solidFill>
+                          <a:srgbClr val="000000"/>
+                        </a:solidFill>
+                        <a:latin typeface="Calibri"/>
+                      </a:endParaRPr>
                     </a:p>
                   </a:txBody>
                   <a:tcPr marL="10082" marR="90728" marT="10082" marB="0" anchor="b">
@@ -13175,7 +13280,6 @@
               <a:rPr lang="pt-PT" dirty="0" smtClean="0"/>
               <a:t>Simplify the development of adaptable systems</a:t>
             </a:r>
-            <a:endParaRPr lang="pt-PT" dirty="0" smtClean="0"/>
           </a:p>
           <a:p>
             <a:pPr>
@@ -13591,7 +13695,7 @@
           <a:p>
             <a:r>
               <a:rPr lang="pt-PT" dirty="0" smtClean="0"/>
-              <a:t>AOM</a:t>
+              <a:t>Adaptive Object-Modelling</a:t>
             </a:r>
             <a:endParaRPr lang="en-US" dirty="0"/>
           </a:p>
@@ -13632,7 +13736,6 @@
               <a:rPr lang="pt-PT" dirty="0" smtClean="0"/>
               <a:t>Experts focus on the manipulation of domain assets, instead of implemention details</a:t>
             </a:r>
-            <a:endParaRPr lang="pt-PT" dirty="0" smtClean="0"/>
           </a:p>
           <a:p>
             <a:pPr>
@@ -13644,7 +13747,6 @@
               <a:rPr lang="pt-PT" dirty="0" smtClean="0"/>
               <a:t>Allows for changes to a system’s domain model in runtime by the end-users</a:t>
             </a:r>
-            <a:endParaRPr lang="pt-PT" dirty="0" smtClean="0"/>
           </a:p>
         </p:txBody>
       </p:sp>
@@ -14350,7 +14452,7 @@
             </a:pPr>
             <a:r>
               <a:rPr lang="pt-PT" dirty="0" smtClean="0"/>
-              <a:t>Reference framework  for the development of AOM systems</a:t>
+              <a:t>Reference framework for the development of AOM systems</a:t>
             </a:r>
             <a:endParaRPr lang="pt-PT" dirty="0" smtClean="0"/>
           </a:p>
@@ -14364,6 +14466,7 @@
               <a:rPr lang="pt-PT" dirty="0" smtClean="0"/>
               <a:t>Developed to answer the problems posed by the aforementioned systems</a:t>
             </a:r>
+            <a:endParaRPr lang="pt-PT" dirty="0" smtClean="0"/>
           </a:p>
           <a:p>
             <a:pPr>
@@ -14373,16 +14476,9 @@
             </a:pPr>
             <a:r>
               <a:rPr lang="pt-PT" dirty="0" smtClean="0"/>
-              <a:t>Allows for the easy creation of highly-customizable, dynamic information systems</a:t>
+              <a:t>Allows for the easy creation of highly customizable, dynamic information systems</a:t>
             </a:r>
-          </a:p>
-          <a:p>
-            <a:pPr>
-              <a:lnSpc>
-                <a:spcPct val="150000"/>
-              </a:lnSpc>
-            </a:pPr>
-            <a:endParaRPr lang="en-US" dirty="0"/>
+            <a:endParaRPr lang="pt-PT" dirty="0" smtClean="0"/>
           </a:p>
         </p:txBody>
       </p:sp>
@@ -14491,7 +14587,6 @@
               <a:rPr lang="pt-PT" dirty="0" smtClean="0"/>
               <a:t>Establish a reference framework using the concepts of web 2.0 for AOM systems</a:t>
             </a:r>
-            <a:endParaRPr lang="pt-PT" dirty="0" smtClean="0"/>
           </a:p>
           <a:p>
             <a:pPr lvl="1">
@@ -14503,7 +14598,6 @@
               <a:rPr lang="pt-PT" dirty="0" smtClean="0"/>
               <a:t>Understand GUI patterns that allow end-users to manipulate domain models</a:t>
             </a:r>
-            <a:endParaRPr lang="pt-PT" dirty="0" smtClean="0"/>
           </a:p>
           <a:p>
             <a:pPr>
@@ -14515,7 +14609,6 @@
               <a:rPr lang="pt-PT" dirty="0" smtClean="0"/>
               <a:t>Validate through an industrial use-case application</a:t>
             </a:r>
-            <a:endParaRPr lang="pt-PT" dirty="0" smtClean="0"/>
           </a:p>
         </p:txBody>
       </p:sp>

</xml_diff>